<commit_message>
ElementBase::GetRuntimeClass() function was renamed GetOptixClass() to avoid confusion with a possible native function. Final definition of construction points in Holo Compatibility with Solemio Holo gratings + correction of many bugs
SolemioTest completed

Signed-off-by: Francois Polack - Ord01022 <francois.polack@synchrotron-soleil.fr>
</commit_message>
<xml_diff>
--- a/schemas.pptx
+++ b/schemas.pptx
@@ -104,6 +104,11 @@
       </a:defRPr>
     </a:lvl9pPr>
   </p:defaultTextStyle>
+  <p:extLst>
+    <p:ext uri="{EFAFB233-063F-42B5-8137-9DF3F51BA10A}">
+      <p15:sldGuideLst xmlns:p15="http://schemas.microsoft.com/office/powerpoint/2012/main"/>
+    </p:ext>
+  </p:extLst>
 </p:presentation>
 </file>
 
@@ -254,7 +259,7 @@
           <a:p>
             <a:fld id="{ED61BEFB-D69F-47E8-B8CB-8BEAEB84D278}" type="datetimeFigureOut">
               <a:rPr lang="fr-FR" smtClean="0"/>
-              <a:t>14/03/2021</a:t>
+              <a:t>22/03/2021</a:t>
             </a:fld>
             <a:endParaRPr lang="fr-FR"/>
           </a:p>
@@ -452,7 +457,7 @@
           <a:p>
             <a:fld id="{ED61BEFB-D69F-47E8-B8CB-8BEAEB84D278}" type="datetimeFigureOut">
               <a:rPr lang="fr-FR" smtClean="0"/>
-              <a:t>14/03/2021</a:t>
+              <a:t>22/03/2021</a:t>
             </a:fld>
             <a:endParaRPr lang="fr-FR"/>
           </a:p>
@@ -660,7 +665,7 @@
           <a:p>
             <a:fld id="{ED61BEFB-D69F-47E8-B8CB-8BEAEB84D278}" type="datetimeFigureOut">
               <a:rPr lang="fr-FR" smtClean="0"/>
-              <a:t>14/03/2021</a:t>
+              <a:t>22/03/2021</a:t>
             </a:fld>
             <a:endParaRPr lang="fr-FR"/>
           </a:p>
@@ -858,7 +863,7 @@
           <a:p>
             <a:fld id="{ED61BEFB-D69F-47E8-B8CB-8BEAEB84D278}" type="datetimeFigureOut">
               <a:rPr lang="fr-FR" smtClean="0"/>
-              <a:t>14/03/2021</a:t>
+              <a:t>22/03/2021</a:t>
             </a:fld>
             <a:endParaRPr lang="fr-FR"/>
           </a:p>
@@ -1133,7 +1138,7 @@
           <a:p>
             <a:fld id="{ED61BEFB-D69F-47E8-B8CB-8BEAEB84D278}" type="datetimeFigureOut">
               <a:rPr lang="fr-FR" smtClean="0"/>
-              <a:t>14/03/2021</a:t>
+              <a:t>22/03/2021</a:t>
             </a:fld>
             <a:endParaRPr lang="fr-FR"/>
           </a:p>
@@ -1398,7 +1403,7 @@
           <a:p>
             <a:fld id="{ED61BEFB-D69F-47E8-B8CB-8BEAEB84D278}" type="datetimeFigureOut">
               <a:rPr lang="fr-FR" smtClean="0"/>
-              <a:t>14/03/2021</a:t>
+              <a:t>22/03/2021</a:t>
             </a:fld>
             <a:endParaRPr lang="fr-FR"/>
           </a:p>
@@ -1810,7 +1815,7 @@
           <a:p>
             <a:fld id="{ED61BEFB-D69F-47E8-B8CB-8BEAEB84D278}" type="datetimeFigureOut">
               <a:rPr lang="fr-FR" smtClean="0"/>
-              <a:t>14/03/2021</a:t>
+              <a:t>22/03/2021</a:t>
             </a:fld>
             <a:endParaRPr lang="fr-FR"/>
           </a:p>
@@ -1951,7 +1956,7 @@
           <a:p>
             <a:fld id="{ED61BEFB-D69F-47E8-B8CB-8BEAEB84D278}" type="datetimeFigureOut">
               <a:rPr lang="fr-FR" smtClean="0"/>
-              <a:t>14/03/2021</a:t>
+              <a:t>22/03/2021</a:t>
             </a:fld>
             <a:endParaRPr lang="fr-FR"/>
           </a:p>
@@ -2064,7 +2069,7 @@
           <a:p>
             <a:fld id="{ED61BEFB-D69F-47E8-B8CB-8BEAEB84D278}" type="datetimeFigureOut">
               <a:rPr lang="fr-FR" smtClean="0"/>
-              <a:t>14/03/2021</a:t>
+              <a:t>22/03/2021</a:t>
             </a:fld>
             <a:endParaRPr lang="fr-FR"/>
           </a:p>
@@ -2375,7 +2380,7 @@
           <a:p>
             <a:fld id="{ED61BEFB-D69F-47E8-B8CB-8BEAEB84D278}" type="datetimeFigureOut">
               <a:rPr lang="fr-FR" smtClean="0"/>
-              <a:t>14/03/2021</a:t>
+              <a:t>22/03/2021</a:t>
             </a:fld>
             <a:endParaRPr lang="fr-FR"/>
           </a:p>
@@ -2663,7 +2668,7 @@
           <a:p>
             <a:fld id="{ED61BEFB-D69F-47E8-B8CB-8BEAEB84D278}" type="datetimeFigureOut">
               <a:rPr lang="fr-FR" smtClean="0"/>
-              <a:t>14/03/2021</a:t>
+              <a:t>22/03/2021</a:t>
             </a:fld>
             <a:endParaRPr lang="fr-FR"/>
           </a:p>
@@ -2904,7 +2909,7 @@
           <a:p>
             <a:fld id="{ED61BEFB-D69F-47E8-B8CB-8BEAEB84D278}" type="datetimeFigureOut">
               <a:rPr lang="fr-FR" smtClean="0"/>
-              <a:t>14/03/2021</a:t>
+              <a:t>22/03/2021</a:t>
             </a:fld>
             <a:endParaRPr lang="fr-FR"/>
           </a:p>
@@ -3336,9 +3341,9 @@
         <p:grpSpPr>
           <a:xfrm>
             <a:off x="1472801" y="703352"/>
-            <a:ext cx="9246398" cy="5966504"/>
+            <a:ext cx="9246398" cy="5594736"/>
             <a:chOff x="1554291" y="703352"/>
-            <a:chExt cx="9246398" cy="5966504"/>
+            <a:chExt cx="9246398" cy="5594736"/>
           </a:xfrm>
         </p:grpSpPr>
         <p:sp>
@@ -4179,8 +4184,8 @@
             </a:p>
           </p:txBody>
         </p:sp>
-        <mc:AlternateContent xmlns:mc="http://schemas.openxmlformats.org/markup-compatibility/2006">
-          <mc:Choice xmlns:a14="http://schemas.microsoft.com/office/drawing/2010/main" Requires="a14">
+        <mc:AlternateContent xmlns:mc="http://schemas.openxmlformats.org/markup-compatibility/2006" xmlns:a14="http://schemas.microsoft.com/office/drawing/2010/main">
+          <mc:Choice Requires="a14">
             <p:sp>
               <p:nvSpPr>
                 <p:cNvPr id="32" name="ZoneTexte 31">
@@ -4448,7 +4453,7 @@
               </p:txBody>
             </p:sp>
           </mc:Choice>
-          <mc:Fallback>
+          <mc:Fallback xmlns="">
             <p:sp>
               <p:nvSpPr>
                 <p:cNvPr id="32" name="ZoneTexte 31">
@@ -4509,8 +4514,8 @@
               </p:nvSpPr>
               <p:spPr>
                 <a:xfrm>
-                  <a:off x="6117939" y="5177332"/>
-                  <a:ext cx="4591065" cy="1492524"/>
+                  <a:off x="6543343" y="5177332"/>
+                  <a:ext cx="3740255" cy="1120756"/>
                 </a:xfrm>
                 <a:prstGeom prst="rect">
                   <a:avLst/>
@@ -4597,82 +4602,6 @@
                                     </m:ctrlPr>
                                   </m:funcPr>
                                   <m:fName>
-                                    <m:f>
-                                      <m:fPr>
-                                        <m:ctrlPr>
-                                          <a:rPr lang="fr-FR" b="0" i="1" smtClean="0">
-                                            <a:latin typeface="Cambria Math" panose="02040503050406030204" pitchFamily="18" charset="0"/>
-                                          </a:rPr>
-                                        </m:ctrlPr>
-                                      </m:fPr>
-                                      <m:num>
-                                        <m:sSub>
-                                          <m:sSubPr>
-                                            <m:ctrlPr>
-                                              <a:rPr lang="fr-FR" b="0" i="1" smtClean="0">
-                                                <a:latin typeface="Cambria Math" panose="02040503050406030204" pitchFamily="18" charset="0"/>
-                                              </a:rPr>
-                                            </m:ctrlPr>
-                                          </m:sSubPr>
-                                          <m:e>
-                                            <m:r>
-                                              <a:rPr lang="fr-FR" b="0" i="1" smtClean="0">
-                                                <a:latin typeface="Cambria Math" panose="02040503050406030204" pitchFamily="18" charset="0"/>
-                                              </a:rPr>
-                                              <m:t>𝐷</m:t>
-                                            </m:r>
-                                          </m:e>
-                                          <m:sub>
-                                            <m:r>
-                                              <a:rPr lang="fr-FR" b="0" i="1" smtClean="0">
-                                                <a:latin typeface="Cambria Math" panose="02040503050406030204" pitchFamily="18" charset="0"/>
-                                              </a:rPr>
-                                              <m:t>1</m:t>
-                                            </m:r>
-                                          </m:sub>
-                                        </m:sSub>
-                                      </m:num>
-                                      <m:den>
-                                        <m:d>
-                                          <m:dPr>
-                                            <m:begChr m:val="|"/>
-                                            <m:endChr m:val="|"/>
-                                            <m:ctrlPr>
-                                              <a:rPr lang="fr-FR" b="0" i="1" smtClean="0">
-                                                <a:latin typeface="Cambria Math" panose="02040503050406030204" pitchFamily="18" charset="0"/>
-                                              </a:rPr>
-                                            </m:ctrlPr>
-                                          </m:dPr>
-                                          <m:e>
-                                            <m:sSub>
-                                              <m:sSubPr>
-                                                <m:ctrlPr>
-                                                  <a:rPr lang="fr-FR" b="0" i="1" smtClean="0">
-                                                    <a:latin typeface="Cambria Math" panose="02040503050406030204" pitchFamily="18" charset="0"/>
-                                                  </a:rPr>
-                                                </m:ctrlPr>
-                                              </m:sSubPr>
-                                              <m:e>
-                                                <m:r>
-                                                  <a:rPr lang="fr-FR" b="0" i="1" smtClean="0">
-                                                    <a:latin typeface="Cambria Math" panose="02040503050406030204" pitchFamily="18" charset="0"/>
-                                                  </a:rPr>
-                                                  <m:t>𝐷</m:t>
-                                                </m:r>
-                                              </m:e>
-                                              <m:sub>
-                                                <m:r>
-                                                  <a:rPr lang="fr-FR" b="0" i="1" smtClean="0">
-                                                    <a:latin typeface="Cambria Math" panose="02040503050406030204" pitchFamily="18" charset="0"/>
-                                                  </a:rPr>
-                                                  <m:t>1</m:t>
-                                                </m:r>
-                                              </m:sub>
-                                            </m:sSub>
-                                          </m:e>
-                                        </m:d>
-                                      </m:den>
-                                    </m:f>
                                     <m:r>
                                       <m:rPr>
                                         <m:sty m:val="p"/>
@@ -4794,82 +4723,6 @@
                                         </m:ctrlPr>
                                       </m:funcPr>
                                       <m:fName>
-                                        <m:f>
-                                          <m:fPr>
-                                            <m:ctrlPr>
-                                              <a:rPr lang="fr-FR" b="0" i="1" smtClean="0">
-                                                <a:latin typeface="Cambria Math" panose="02040503050406030204" pitchFamily="18" charset="0"/>
-                                              </a:rPr>
-                                            </m:ctrlPr>
-                                          </m:fPr>
-                                          <m:num>
-                                            <m:sSub>
-                                              <m:sSubPr>
-                                                <m:ctrlPr>
-                                                  <a:rPr lang="fr-FR" b="0" i="1" smtClean="0">
-                                                    <a:latin typeface="Cambria Math" panose="02040503050406030204" pitchFamily="18" charset="0"/>
-                                                  </a:rPr>
-                                                </m:ctrlPr>
-                                              </m:sSubPr>
-                                              <m:e>
-                                                <m:r>
-                                                  <a:rPr lang="fr-FR" b="0" i="1" smtClean="0">
-                                                    <a:latin typeface="Cambria Math" panose="02040503050406030204" pitchFamily="18" charset="0"/>
-                                                  </a:rPr>
-                                                  <m:t>𝐷</m:t>
-                                                </m:r>
-                                              </m:e>
-                                              <m:sub>
-                                                <m:r>
-                                                  <a:rPr lang="fr-FR" b="0" i="1" smtClean="0">
-                                                    <a:latin typeface="Cambria Math" panose="02040503050406030204" pitchFamily="18" charset="0"/>
-                                                  </a:rPr>
-                                                  <m:t>2</m:t>
-                                                </m:r>
-                                              </m:sub>
-                                            </m:sSub>
-                                          </m:num>
-                                          <m:den>
-                                            <m:d>
-                                              <m:dPr>
-                                                <m:begChr m:val="|"/>
-                                                <m:endChr m:val="|"/>
-                                                <m:ctrlPr>
-                                                  <a:rPr lang="fr-FR" b="0" i="1" smtClean="0">
-                                                    <a:latin typeface="Cambria Math" panose="02040503050406030204" pitchFamily="18" charset="0"/>
-                                                  </a:rPr>
-                                                </m:ctrlPr>
-                                              </m:dPr>
-                                              <m:e>
-                                                <m:sSub>
-                                                  <m:sSubPr>
-                                                    <m:ctrlPr>
-                                                      <a:rPr lang="fr-FR" b="0" i="1" smtClean="0">
-                                                        <a:latin typeface="Cambria Math" panose="02040503050406030204" pitchFamily="18" charset="0"/>
-                                                      </a:rPr>
-                                                    </m:ctrlPr>
-                                                  </m:sSubPr>
-                                                  <m:e>
-                                                    <m:r>
-                                                      <a:rPr lang="fr-FR" b="0" i="1" smtClean="0">
-                                                        <a:latin typeface="Cambria Math" panose="02040503050406030204" pitchFamily="18" charset="0"/>
-                                                      </a:rPr>
-                                                      <m:t>𝐷</m:t>
-                                                    </m:r>
-                                                  </m:e>
-                                                  <m:sub>
-                                                    <m:r>
-                                                      <a:rPr lang="fr-FR" b="0" i="1" smtClean="0">
-                                                        <a:latin typeface="Cambria Math" panose="02040503050406030204" pitchFamily="18" charset="0"/>
-                                                      </a:rPr>
-                                                      <m:t>2</m:t>
-                                                    </m:r>
-                                                  </m:sub>
-                                                </m:sSub>
-                                              </m:e>
-                                            </m:d>
-                                          </m:den>
-                                        </m:f>
                                         <m:r>
                                           <m:rPr>
                                             <m:sty m:val="p"/>
@@ -4999,82 +4852,6 @@
                                     </m:ctrlPr>
                                   </m:funcPr>
                                   <m:fName>
-                                    <m:f>
-                                      <m:fPr>
-                                        <m:ctrlPr>
-                                          <a:rPr lang="fr-FR" b="0" i="1" smtClean="0">
-                                            <a:latin typeface="Cambria Math" panose="02040503050406030204" pitchFamily="18" charset="0"/>
-                                          </a:rPr>
-                                        </m:ctrlPr>
-                                      </m:fPr>
-                                      <m:num>
-                                        <m:sSub>
-                                          <m:sSubPr>
-                                            <m:ctrlPr>
-                                              <a:rPr lang="fr-FR" b="0" i="1" smtClean="0">
-                                                <a:latin typeface="Cambria Math" panose="02040503050406030204" pitchFamily="18" charset="0"/>
-                                              </a:rPr>
-                                            </m:ctrlPr>
-                                          </m:sSubPr>
-                                          <m:e>
-                                            <m:r>
-                                              <a:rPr lang="fr-FR" b="0" i="1" smtClean="0">
-                                                <a:latin typeface="Cambria Math" panose="02040503050406030204" pitchFamily="18" charset="0"/>
-                                              </a:rPr>
-                                              <m:t>𝐷</m:t>
-                                            </m:r>
-                                          </m:e>
-                                          <m:sub>
-                                            <m:r>
-                                              <a:rPr lang="fr-FR" b="0" i="1" smtClean="0">
-                                                <a:latin typeface="Cambria Math" panose="02040503050406030204" pitchFamily="18" charset="0"/>
-                                              </a:rPr>
-                                              <m:t>1</m:t>
-                                            </m:r>
-                                          </m:sub>
-                                        </m:sSub>
-                                      </m:num>
-                                      <m:den>
-                                        <m:d>
-                                          <m:dPr>
-                                            <m:begChr m:val="|"/>
-                                            <m:endChr m:val="|"/>
-                                            <m:ctrlPr>
-                                              <a:rPr lang="fr-FR" b="0" i="1" smtClean="0">
-                                                <a:latin typeface="Cambria Math" panose="02040503050406030204" pitchFamily="18" charset="0"/>
-                                              </a:rPr>
-                                            </m:ctrlPr>
-                                          </m:dPr>
-                                          <m:e>
-                                            <m:sSub>
-                                              <m:sSubPr>
-                                                <m:ctrlPr>
-                                                  <a:rPr lang="fr-FR" b="0" i="1" smtClean="0">
-                                                    <a:latin typeface="Cambria Math" panose="02040503050406030204" pitchFamily="18" charset="0"/>
-                                                  </a:rPr>
-                                                </m:ctrlPr>
-                                              </m:sSubPr>
-                                              <m:e>
-                                                <m:r>
-                                                  <a:rPr lang="fr-FR" b="0" i="1" smtClean="0">
-                                                    <a:latin typeface="Cambria Math" panose="02040503050406030204" pitchFamily="18" charset="0"/>
-                                                  </a:rPr>
-                                                  <m:t>𝐷</m:t>
-                                                </m:r>
-                                              </m:e>
-                                              <m:sub>
-                                                <m:r>
-                                                  <a:rPr lang="fr-FR" b="0" i="1" smtClean="0">
-                                                    <a:latin typeface="Cambria Math" panose="02040503050406030204" pitchFamily="18" charset="0"/>
-                                                  </a:rPr>
-                                                  <m:t>1</m:t>
-                                                </m:r>
-                                              </m:sub>
-                                            </m:sSub>
-                                          </m:e>
-                                        </m:d>
-                                      </m:den>
-                                    </m:f>
                                     <m:r>
                                       <m:rPr>
                                         <m:sty m:val="p"/>
@@ -5188,82 +4965,6 @@
                                     </m:ctrlPr>
                                   </m:funcPr>
                                   <m:fName>
-                                    <m:f>
-                                      <m:fPr>
-                                        <m:ctrlPr>
-                                          <a:rPr lang="fr-FR" b="0" i="1" smtClean="0">
-                                            <a:latin typeface="Cambria Math" panose="02040503050406030204" pitchFamily="18" charset="0"/>
-                                          </a:rPr>
-                                        </m:ctrlPr>
-                                      </m:fPr>
-                                      <m:num>
-                                        <m:sSub>
-                                          <m:sSubPr>
-                                            <m:ctrlPr>
-                                              <a:rPr lang="fr-FR" b="0" i="1" smtClean="0">
-                                                <a:latin typeface="Cambria Math" panose="02040503050406030204" pitchFamily="18" charset="0"/>
-                                              </a:rPr>
-                                            </m:ctrlPr>
-                                          </m:sSubPr>
-                                          <m:e>
-                                            <m:r>
-                                              <a:rPr lang="fr-FR" b="0" i="1" smtClean="0">
-                                                <a:latin typeface="Cambria Math" panose="02040503050406030204" pitchFamily="18" charset="0"/>
-                                              </a:rPr>
-                                              <m:t>𝐷</m:t>
-                                            </m:r>
-                                          </m:e>
-                                          <m:sub>
-                                            <m:r>
-                                              <a:rPr lang="fr-FR" b="0" i="1" smtClean="0">
-                                                <a:latin typeface="Cambria Math" panose="02040503050406030204" pitchFamily="18" charset="0"/>
-                                              </a:rPr>
-                                              <m:t>2</m:t>
-                                            </m:r>
-                                          </m:sub>
-                                        </m:sSub>
-                                      </m:num>
-                                      <m:den>
-                                        <m:d>
-                                          <m:dPr>
-                                            <m:begChr m:val="|"/>
-                                            <m:endChr m:val="|"/>
-                                            <m:ctrlPr>
-                                              <a:rPr lang="fr-FR" b="0" i="1" smtClean="0">
-                                                <a:latin typeface="Cambria Math" panose="02040503050406030204" pitchFamily="18" charset="0"/>
-                                              </a:rPr>
-                                            </m:ctrlPr>
-                                          </m:dPr>
-                                          <m:e>
-                                            <m:sSub>
-                                              <m:sSubPr>
-                                                <m:ctrlPr>
-                                                  <a:rPr lang="fr-FR" b="0" i="1" smtClean="0">
-                                                    <a:latin typeface="Cambria Math" panose="02040503050406030204" pitchFamily="18" charset="0"/>
-                                                  </a:rPr>
-                                                </m:ctrlPr>
-                                              </m:sSubPr>
-                                              <m:e>
-                                                <m:r>
-                                                  <a:rPr lang="fr-FR" b="0" i="1" smtClean="0">
-                                                    <a:latin typeface="Cambria Math" panose="02040503050406030204" pitchFamily="18" charset="0"/>
-                                                  </a:rPr>
-                                                  <m:t>𝐷</m:t>
-                                                </m:r>
-                                              </m:e>
-                                              <m:sub>
-                                                <m:r>
-                                                  <a:rPr lang="fr-FR" b="0" i="1" smtClean="0">
-                                                    <a:latin typeface="Cambria Math" panose="02040503050406030204" pitchFamily="18" charset="0"/>
-                                                  </a:rPr>
-                                                  <m:t>2</m:t>
-                                                </m:r>
-                                              </m:sub>
-                                            </m:sSub>
-                                          </m:e>
-                                        </m:d>
-                                      </m:den>
-                                    </m:f>
                                     <m:r>
                                       <m:rPr>
                                         <m:sty m:val="p"/>
@@ -5404,8 +5105,8 @@
               </p:nvSpPr>
               <p:spPr>
                 <a:xfrm>
-                  <a:off x="6117939" y="5177332"/>
-                  <a:ext cx="4591065" cy="1492524"/>
+                  <a:off x="6543343" y="5177332"/>
+                  <a:ext cx="3740255" cy="1120756"/>
                 </a:xfrm>
                 <a:prstGeom prst="rect">
                   <a:avLst/>
@@ -5413,7 +5114,7 @@
                 <a:blipFill>
                   <a:blip r:embed="rId3"/>
                   <a:stretch>
-                    <a:fillRect t="-2041"/>
+                    <a:fillRect t="-2717"/>
                   </a:stretch>
                 </a:blipFill>
               </p:spPr>

</xml_diff>